<commit_message>
Add 3rd slide for parallelization
</commit_message>
<xml_diff>
--- a/Progetto_HPC.pptx
+++ b/Progetto_HPC.pptx
@@ -657,7 +657,7 @@
           <a:effectLst/>
           <a:extLst>
             <a:ext uri="{91240B29-F687-4f45-9708-019B960494DF}">
-              <a14:hiddenLine xmlns:a14="http://schemas.microsoft.com/office/drawing/2010/main" xmlns="" w="9525">
+              <a14:hiddenLine xmlns="" xmlns:a14="http://schemas.microsoft.com/office/drawing/2010/main" w="9525">
                 <a:solidFill>
                   <a:srgbClr val="000000"/>
                 </a:solidFill>
@@ -2179,7 +2179,7 @@
           <a:ln/>
           <a:extLst>
             <a:ext uri="{91240B29-F687-4f45-9708-019B960494DF}">
-              <a14:hiddenLine xmlns:a14="http://schemas.microsoft.com/office/drawing/2010/main" xmlns="" w="9525">
+              <a14:hiddenLine xmlns="" xmlns:a14="http://schemas.microsoft.com/office/drawing/2010/main" w="9525">
                 <a:solidFill>
                   <a:srgbClr val="000000"/>
                 </a:solidFill>
@@ -2454,7 +2454,7 @@
           <a:ln/>
           <a:extLst>
             <a:ext uri="{91240B29-F687-4f45-9708-019B960494DF}">
-              <a14:hiddenLine xmlns:a14="http://schemas.microsoft.com/office/drawing/2010/main" xmlns="" w="9525">
+              <a14:hiddenLine xmlns="" xmlns:a14="http://schemas.microsoft.com/office/drawing/2010/main" w="9525">
                 <a:solidFill>
                   <a:srgbClr val="000000"/>
                 </a:solidFill>
@@ -2737,7 +2737,7 @@
           <a:ln/>
           <a:extLst>
             <a:ext uri="{91240B29-F687-4f45-9708-019B960494DF}">
-              <a14:hiddenLine xmlns:a14="http://schemas.microsoft.com/office/drawing/2010/main" xmlns="" w="9525">
+              <a14:hiddenLine xmlns="" xmlns:a14="http://schemas.microsoft.com/office/drawing/2010/main" w="9525">
                 <a:solidFill>
                   <a:srgbClr val="000000"/>
                 </a:solidFill>
@@ -3363,7 +3363,7 @@
           <a:ln/>
           <a:extLst>
             <a:ext uri="{91240B29-F687-4f45-9708-019B960494DF}">
-              <a14:hiddenLine xmlns:a14="http://schemas.microsoft.com/office/drawing/2010/main" xmlns="" w="9525">
+              <a14:hiddenLine xmlns="" xmlns:a14="http://schemas.microsoft.com/office/drawing/2010/main" w="9525">
                 <a:solidFill>
                   <a:srgbClr val="000000"/>
                 </a:solidFill>
@@ -3702,7 +3702,7 @@
           <a:ln/>
           <a:extLst>
             <a:ext uri="{91240B29-F687-4f45-9708-019B960494DF}">
-              <a14:hiddenLine xmlns:a14="http://schemas.microsoft.com/office/drawing/2010/main" xmlns="" w="9525">
+              <a14:hiddenLine xmlns="" xmlns:a14="http://schemas.microsoft.com/office/drawing/2010/main" w="9525">
                 <a:solidFill>
                   <a:srgbClr val="000000"/>
                 </a:solidFill>
@@ -4179,7 +4179,7 @@
           <a:ln/>
           <a:extLst>
             <a:ext uri="{91240B29-F687-4f45-9708-019B960494DF}">
-              <a14:hiddenLine xmlns:a14="http://schemas.microsoft.com/office/drawing/2010/main" xmlns="" w="9525">
+              <a14:hiddenLine xmlns="" xmlns:a14="http://schemas.microsoft.com/office/drawing/2010/main" w="9525">
                 <a:solidFill>
                   <a:srgbClr val="000000"/>
                 </a:solidFill>
@@ -4608,7 +4608,7 @@
           <a:ln/>
           <a:extLst>
             <a:ext uri="{91240B29-F687-4f45-9708-019B960494DF}">
-              <a14:hiddenLine xmlns:a14="http://schemas.microsoft.com/office/drawing/2010/main" xmlns="" w="9525">
+              <a14:hiddenLine xmlns="" xmlns:a14="http://schemas.microsoft.com/office/drawing/2010/main" w="9525">
                 <a:solidFill>
                   <a:srgbClr val="000000"/>
                 </a:solidFill>
@@ -6511,37 +6511,118 @@
           </a:prstGeom>
         </p:spPr>
       </p:pic>
-      <p:pic>
-        <p:nvPicPr>
-          <p:cNvPr id="9" name="Immagine 8">
+      <p:grpSp>
+        <p:nvGrpSpPr>
+          <p:cNvPr id="8" name="Gruppo 7">
             <a:extLst>
               <a:ext uri="{FF2B5EF4-FFF2-40B4-BE49-F238E27FC236}">
-                <a16:creationId xmlns:a16="http://schemas.microsoft.com/office/drawing/2014/main" id="{27B48C32-9862-1605-491E-DF57D1BEBD73}"/>
+                <a16:creationId xmlns:a16="http://schemas.microsoft.com/office/drawing/2014/main" id="{E8F77026-8720-7E11-C368-CBAFD4D198C7}"/>
               </a:ext>
             </a:extLst>
           </p:cNvPr>
-          <p:cNvPicPr>
-            <a:picLocks noChangeAspect="1"/>
-          </p:cNvPicPr>
+          <p:cNvGrpSpPr/>
           <p:nvPr/>
-        </p:nvPicPr>
-        <p:blipFill>
-          <a:blip r:embed="rId2"/>
-          <a:srcRect t="65550"/>
-          <a:stretch>
-            <a:fillRect/>
-          </a:stretch>
-        </p:blipFill>
-        <p:spPr>
+        </p:nvGrpSpPr>
+        <p:grpSpPr>
           <a:xfrm>
-            <a:off x="5867398" y="3143249"/>
-            <a:ext cx="6173061" cy="1877185"/>
+            <a:off x="5840413" y="2755394"/>
+            <a:ext cx="6173061" cy="3076571"/>
+            <a:chOff x="5867845" y="2519935"/>
+            <a:chExt cx="6173061" cy="3076571"/>
           </a:xfrm>
-          <a:prstGeom prst="rect">
-            <a:avLst/>
-          </a:prstGeom>
-        </p:spPr>
-      </p:pic>
+        </p:grpSpPr>
+        <p:pic>
+          <p:nvPicPr>
+            <p:cNvPr id="9" name="Immagine 8">
+              <a:extLst>
+                <a:ext uri="{FF2B5EF4-FFF2-40B4-BE49-F238E27FC236}">
+                  <a16:creationId xmlns:a16="http://schemas.microsoft.com/office/drawing/2014/main" id="{27B48C32-9862-1605-491E-DF57D1BEBD73}"/>
+                </a:ext>
+              </a:extLst>
+            </p:cNvPr>
+            <p:cNvPicPr>
+              <a:picLocks noChangeAspect="1"/>
+            </p:cNvPicPr>
+            <p:nvPr/>
+          </p:nvPicPr>
+          <p:blipFill>
+            <a:blip r:embed="rId2"/>
+            <a:srcRect t="65550"/>
+            <a:stretch>
+              <a:fillRect/>
+            </a:stretch>
+          </p:blipFill>
+          <p:spPr>
+            <a:xfrm>
+              <a:off x="5867845" y="3719321"/>
+              <a:ext cx="6173061" cy="1877185"/>
+            </a:xfrm>
+            <a:prstGeom prst="rect">
+              <a:avLst/>
+            </a:prstGeom>
+          </p:spPr>
+        </p:pic>
+        <p:pic>
+          <p:nvPicPr>
+            <p:cNvPr id="4" name="Immagine 3">
+              <a:extLst>
+                <a:ext uri="{FF2B5EF4-FFF2-40B4-BE49-F238E27FC236}">
+                  <a16:creationId xmlns:a16="http://schemas.microsoft.com/office/drawing/2014/main" id="{78C83EF3-5C92-636B-2424-621A8DC22C3E}"/>
+                </a:ext>
+              </a:extLst>
+            </p:cNvPr>
+            <p:cNvPicPr>
+              <a:picLocks noChangeAspect="1"/>
+            </p:cNvPicPr>
+            <p:nvPr/>
+          </p:nvPicPr>
+          <p:blipFill>
+            <a:blip r:embed="rId3"/>
+            <a:stretch>
+              <a:fillRect/>
+            </a:stretch>
+          </p:blipFill>
+          <p:spPr>
+            <a:xfrm>
+              <a:off x="5950141" y="2519935"/>
+              <a:ext cx="4534533" cy="600159"/>
+            </a:xfrm>
+            <a:prstGeom prst="rect">
+              <a:avLst/>
+            </a:prstGeom>
+          </p:spPr>
+        </p:pic>
+        <p:pic>
+          <p:nvPicPr>
+            <p:cNvPr id="7" name="Immagine 6">
+              <a:extLst>
+                <a:ext uri="{FF2B5EF4-FFF2-40B4-BE49-F238E27FC236}">
+                  <a16:creationId xmlns:a16="http://schemas.microsoft.com/office/drawing/2014/main" id="{93036A05-2EBF-4E57-01BB-7F93A3837F9F}"/>
+                </a:ext>
+              </a:extLst>
+            </p:cNvPr>
+            <p:cNvPicPr>
+              <a:picLocks noChangeAspect="1"/>
+            </p:cNvPicPr>
+            <p:nvPr/>
+          </p:nvPicPr>
+          <p:blipFill>
+            <a:blip r:embed="rId4"/>
+            <a:stretch>
+              <a:fillRect/>
+            </a:stretch>
+          </p:blipFill>
+          <p:spPr>
+            <a:xfrm>
+              <a:off x="5950141" y="3166710"/>
+              <a:ext cx="4906060" cy="562053"/>
+            </a:xfrm>
+            <a:prstGeom prst="rect">
+              <a:avLst/>
+            </a:prstGeom>
+          </p:spPr>
+        </p:pic>
+      </p:grpSp>
     </p:spTree>
     <p:extLst>
       <p:ext uri="{BB962C8B-B14F-4D97-AF65-F5344CB8AC3E}">

</xml_diff>